<commit_message>
more work on figures
</commit_message>
<xml_diff>
--- a/img/figs.pptx
+++ b/img/figs.pptx
@@ -5,7 +5,7 @@
     <p:sldMasterId id="2147483648" r:id="rId1"/>
   </p:sldMasterIdLst>
   <p:notesMasterIdLst>
-    <p:notesMasterId r:id="rId8"/>
+    <p:notesMasterId r:id="rId12"/>
   </p:notesMasterIdLst>
   <p:sldIdLst>
     <p:sldId id="256" r:id="rId2"/>
@@ -14,6 +14,10 @@
     <p:sldId id="259" r:id="rId5"/>
     <p:sldId id="260" r:id="rId6"/>
     <p:sldId id="261" r:id="rId7"/>
+    <p:sldId id="262" r:id="rId8"/>
+    <p:sldId id="263" r:id="rId9"/>
+    <p:sldId id="264" r:id="rId10"/>
+    <p:sldId id="265" r:id="rId11"/>
   </p:sldIdLst>
   <p:sldSz cx="12192000" cy="6858000"/>
   <p:notesSz cx="6858000" cy="9144000"/>
@@ -112,6 +116,11 @@
       </a:defRPr>
     </a:lvl9pPr>
   </p:defaultTextStyle>
+  <p:extLst>
+    <p:ext uri="{EFAFB233-063F-42B5-8137-9DF3F51BA10A}">
+      <p15:sldGuideLst xmlns:p15="http://schemas.microsoft.com/office/powerpoint/2012/main"/>
+    </p:ext>
+  </p:extLst>
 </p:presentation>
 </file>
 
@@ -197,7 +206,7 @@
           <a:p>
             <a:fld id="{10A41DE2-BC10-F04F-98A8-E054FB26CDFF}" type="datetimeFigureOut">
               <a:rPr lang="en-US" smtClean="0"/>
-              <a:t>7/26/19</a:t>
+              <a:t>7/27/19</a:t>
             </a:fld>
             <a:endParaRPr lang="en-US"/>
           </a:p>
@@ -695,7 +704,7 @@
           <a:p>
             <a:fld id="{7E318D30-1040-7443-8111-D0DBEBCCCF60}" type="datetimeFigureOut">
               <a:rPr lang="en-US" smtClean="0"/>
-              <a:t>7/26/19</a:t>
+              <a:t>7/27/19</a:t>
             </a:fld>
             <a:endParaRPr lang="en-US"/>
           </a:p>
@@ -893,7 +902,7 @@
           <a:p>
             <a:fld id="{7E318D30-1040-7443-8111-D0DBEBCCCF60}" type="datetimeFigureOut">
               <a:rPr lang="en-US" smtClean="0"/>
-              <a:t>7/26/19</a:t>
+              <a:t>7/27/19</a:t>
             </a:fld>
             <a:endParaRPr lang="en-US"/>
           </a:p>
@@ -1101,7 +1110,7 @@
           <a:p>
             <a:fld id="{7E318D30-1040-7443-8111-D0DBEBCCCF60}" type="datetimeFigureOut">
               <a:rPr lang="en-US" smtClean="0"/>
-              <a:t>7/26/19</a:t>
+              <a:t>7/27/19</a:t>
             </a:fld>
             <a:endParaRPr lang="en-US"/>
           </a:p>
@@ -1299,7 +1308,7 @@
           <a:p>
             <a:fld id="{7E318D30-1040-7443-8111-D0DBEBCCCF60}" type="datetimeFigureOut">
               <a:rPr lang="en-US" smtClean="0"/>
-              <a:t>7/26/19</a:t>
+              <a:t>7/27/19</a:t>
             </a:fld>
             <a:endParaRPr lang="en-US"/>
           </a:p>
@@ -1574,7 +1583,7 @@
           <a:p>
             <a:fld id="{7E318D30-1040-7443-8111-D0DBEBCCCF60}" type="datetimeFigureOut">
               <a:rPr lang="en-US" smtClean="0"/>
-              <a:t>7/26/19</a:t>
+              <a:t>7/27/19</a:t>
             </a:fld>
             <a:endParaRPr lang="en-US"/>
           </a:p>
@@ -1839,7 +1848,7 @@
           <a:p>
             <a:fld id="{7E318D30-1040-7443-8111-D0DBEBCCCF60}" type="datetimeFigureOut">
               <a:rPr lang="en-US" smtClean="0"/>
-              <a:t>7/26/19</a:t>
+              <a:t>7/27/19</a:t>
             </a:fld>
             <a:endParaRPr lang="en-US"/>
           </a:p>
@@ -2251,7 +2260,7 @@
           <a:p>
             <a:fld id="{7E318D30-1040-7443-8111-D0DBEBCCCF60}" type="datetimeFigureOut">
               <a:rPr lang="en-US" smtClean="0"/>
-              <a:t>7/26/19</a:t>
+              <a:t>7/27/19</a:t>
             </a:fld>
             <a:endParaRPr lang="en-US"/>
           </a:p>
@@ -2392,7 +2401,7 @@
           <a:p>
             <a:fld id="{7E318D30-1040-7443-8111-D0DBEBCCCF60}" type="datetimeFigureOut">
               <a:rPr lang="en-US" smtClean="0"/>
-              <a:t>7/26/19</a:t>
+              <a:t>7/27/19</a:t>
             </a:fld>
             <a:endParaRPr lang="en-US"/>
           </a:p>
@@ -2505,7 +2514,7 @@
           <a:p>
             <a:fld id="{7E318D30-1040-7443-8111-D0DBEBCCCF60}" type="datetimeFigureOut">
               <a:rPr lang="en-US" smtClean="0"/>
-              <a:t>7/26/19</a:t>
+              <a:t>7/27/19</a:t>
             </a:fld>
             <a:endParaRPr lang="en-US"/>
           </a:p>
@@ -2816,7 +2825,7 @@
           <a:p>
             <a:fld id="{7E318D30-1040-7443-8111-D0DBEBCCCF60}" type="datetimeFigureOut">
               <a:rPr lang="en-US" smtClean="0"/>
-              <a:t>7/26/19</a:t>
+              <a:t>7/27/19</a:t>
             </a:fld>
             <a:endParaRPr lang="en-US"/>
           </a:p>
@@ -3104,7 +3113,7 @@
           <a:p>
             <a:fld id="{7E318D30-1040-7443-8111-D0DBEBCCCF60}" type="datetimeFigureOut">
               <a:rPr lang="en-US" smtClean="0"/>
-              <a:t>7/26/19</a:t>
+              <a:t>7/27/19</a:t>
             </a:fld>
             <a:endParaRPr lang="en-US"/>
           </a:p>
@@ -3345,7 +3354,7 @@
           <a:p>
             <a:fld id="{7E318D30-1040-7443-8111-D0DBEBCCCF60}" type="datetimeFigureOut">
               <a:rPr lang="en-US" smtClean="0"/>
-              <a:t>7/26/19</a:t>
+              <a:t>7/27/19</a:t>
             </a:fld>
             <a:endParaRPr lang="en-US"/>
           </a:p>
@@ -4558,6 +4567,188 @@
 </p:sld>
 </file>
 
+<file path=ppt/slides/slide10.xml><?xml version="1.0" encoding="utf-8"?>
+<p:sld xmlns:a="http://schemas.openxmlformats.org/drawingml/2006/main" xmlns:r="http://schemas.openxmlformats.org/officeDocument/2006/relationships" xmlns:p="http://schemas.openxmlformats.org/presentationml/2006/main">
+  <p:cSld>
+    <p:spTree>
+      <p:nvGrpSpPr>
+        <p:cNvPr id="1" name=""/>
+        <p:cNvGrpSpPr/>
+        <p:nvPr/>
+      </p:nvGrpSpPr>
+      <p:grpSpPr>
+        <a:xfrm>
+          <a:off x="0" y="0"/>
+          <a:ext cx="0" cy="0"/>
+          <a:chOff x="0" y="0"/>
+          <a:chExt cx="0" cy="0"/>
+        </a:xfrm>
+      </p:grpSpPr>
+      <p:pic>
+        <p:nvPicPr>
+          <p:cNvPr id="3" name="Picture 2">
+            <a:extLst>
+              <a:ext uri="{FF2B5EF4-FFF2-40B4-BE49-F238E27FC236}">
+                <a16:creationId xmlns:a16="http://schemas.microsoft.com/office/drawing/2014/main" id="{4110BD80-AF38-6841-A7DD-28315F30584D}"/>
+              </a:ext>
+            </a:extLst>
+          </p:cNvPr>
+          <p:cNvPicPr>
+            <a:picLocks noChangeAspect="1"/>
+          </p:cNvPicPr>
+          <p:nvPr/>
+        </p:nvPicPr>
+        <p:blipFill>
+          <a:blip r:embed="rId2"/>
+          <a:stretch>
+            <a:fillRect/>
+          </a:stretch>
+        </p:blipFill>
+        <p:spPr>
+          <a:xfrm>
+            <a:off x="3416300" y="1536700"/>
+            <a:ext cx="5359400" cy="3784600"/>
+          </a:xfrm>
+          <a:prstGeom prst="rect">
+            <a:avLst/>
+          </a:prstGeom>
+        </p:spPr>
+      </p:pic>
+      <p:sp>
+        <p:nvSpPr>
+          <p:cNvPr id="4" name="TextBox 3">
+            <a:extLst>
+              <a:ext uri="{FF2B5EF4-FFF2-40B4-BE49-F238E27FC236}">
+                <a16:creationId xmlns:a16="http://schemas.microsoft.com/office/drawing/2014/main" id="{43436FDB-806E-A24D-B9B0-0C58FFCC23DC}"/>
+              </a:ext>
+            </a:extLst>
+          </p:cNvPr>
+          <p:cNvSpPr txBox="1"/>
+          <p:nvPr/>
+        </p:nvSpPr>
+        <p:spPr>
+          <a:xfrm>
+            <a:off x="3721427" y="5332192"/>
+            <a:ext cx="5054273" cy="369332"/>
+          </a:xfrm>
+          <a:prstGeom prst="rect">
+            <a:avLst/>
+          </a:prstGeom>
+          <a:noFill/>
+        </p:spPr>
+        <p:txBody>
+          <a:bodyPr wrap="square" rtlCol="0">
+            <a:spAutoFit/>
+          </a:bodyPr>
+          <a:lstStyle/>
+          <a:p>
+            <a:pPr algn="ctr"/>
+            <a:r>
+              <a:rPr lang="en-US" dirty="0"/>
+              <a:t>Ranked Row Index</a:t>
+            </a:r>
+          </a:p>
+        </p:txBody>
+      </p:sp>
+      <p:sp>
+        <p:nvSpPr>
+          <p:cNvPr id="5" name="TextBox 4">
+            <a:extLst>
+              <a:ext uri="{FF2B5EF4-FFF2-40B4-BE49-F238E27FC236}">
+                <a16:creationId xmlns:a16="http://schemas.microsoft.com/office/drawing/2014/main" id="{EAD5426F-D511-7F4A-8761-A17FE73C3DBE}"/>
+              </a:ext>
+            </a:extLst>
+          </p:cNvPr>
+          <p:cNvSpPr txBox="1"/>
+          <p:nvPr/>
+        </p:nvSpPr>
+        <p:spPr>
+          <a:xfrm rot="16200000">
+            <a:off x="1448490" y="3135177"/>
+            <a:ext cx="3566287" cy="369332"/>
+          </a:xfrm>
+          <a:prstGeom prst="rect">
+            <a:avLst/>
+          </a:prstGeom>
+          <a:noFill/>
+        </p:spPr>
+        <p:txBody>
+          <a:bodyPr wrap="square" rtlCol="0">
+            <a:spAutoFit/>
+          </a:bodyPr>
+          <a:lstStyle/>
+          <a:p>
+            <a:pPr algn="ctr"/>
+            <a:r>
+              <a:rPr lang="en-US" dirty="0" err="1"/>
+              <a:t>p_DEFAULT_NEXT_MONTH</a:t>
+            </a:r>
+            <a:endParaRPr lang="en-US" dirty="0"/>
+          </a:p>
+        </p:txBody>
+      </p:sp>
+      <p:sp>
+        <p:nvSpPr>
+          <p:cNvPr id="6" name="TextBox 5">
+            <a:extLst>
+              <a:ext uri="{FF2B5EF4-FFF2-40B4-BE49-F238E27FC236}">
+                <a16:creationId xmlns:a16="http://schemas.microsoft.com/office/drawing/2014/main" id="{B841546A-5D34-384D-BCEF-3D6CF4BB9661}"/>
+              </a:ext>
+            </a:extLst>
+          </p:cNvPr>
+          <p:cNvSpPr txBox="1"/>
+          <p:nvPr/>
+        </p:nvSpPr>
+        <p:spPr>
+          <a:xfrm>
+            <a:off x="6336580" y="1575887"/>
+            <a:ext cx="2439120" cy="646331"/>
+          </a:xfrm>
+          <a:prstGeom prst="rect">
+            <a:avLst/>
+          </a:prstGeom>
+          <a:noFill/>
+        </p:spPr>
+        <p:txBody>
+          <a:bodyPr wrap="square" rtlCol="0">
+            <a:spAutoFit/>
+          </a:bodyPr>
+          <a:lstStyle/>
+          <a:p>
+            <a:r>
+              <a:rPr lang="en-US" sz="1200" dirty="0" err="1"/>
+              <a:t>p_glm_DEFAULT_NEXT_MONTH</a:t>
+            </a:r>
+            <a:endParaRPr lang="en-US" sz="1200" dirty="0"/>
+          </a:p>
+          <a:p>
+            <a:r>
+              <a:rPr lang="en-US" sz="1200" dirty="0" err="1"/>
+              <a:t>p_gbm_DEFAULT_NEXT_MONTH</a:t>
+            </a:r>
+            <a:endParaRPr lang="en-US" sz="1200" dirty="0"/>
+          </a:p>
+          <a:p>
+            <a:r>
+              <a:rPr lang="en-US" sz="1200" dirty="0"/>
+              <a:t>DEFAULT_NEXT_MONTH</a:t>
+            </a:r>
+          </a:p>
+        </p:txBody>
+      </p:sp>
+    </p:spTree>
+    <p:extLst>
+      <p:ext uri="{BB962C8B-B14F-4D97-AF65-F5344CB8AC3E}">
+        <p14:creationId xmlns:p14="http://schemas.microsoft.com/office/powerpoint/2010/main" val="786435049"/>
+      </p:ext>
+    </p:extLst>
+  </p:cSld>
+  <p:clrMapOvr>
+    <a:masterClrMapping/>
+  </p:clrMapOvr>
+</p:sld>
+</file>
+
 <file path=ppt/slides/slide2.xml><?xml version="1.0" encoding="utf-8"?>
 <p:sld xmlns:a="http://schemas.openxmlformats.org/drawingml/2006/main" xmlns:r="http://schemas.openxmlformats.org/officeDocument/2006/relationships" xmlns:p="http://schemas.openxmlformats.org/presentationml/2006/main">
   <p:cSld>
@@ -4664,7 +4855,7 @@
             </a:pPr>
             <a:r>
               <a:rPr lang="en-US" sz="1650" dirty="0"/>
-              <a:t>PAY_AMT_2</a:t>
+              <a:t>PAY_AMT2</a:t>
             </a:r>
           </a:p>
           <a:p>
@@ -6760,10 +6951,10 @@
       </p:sp>
       <p:sp>
         <p:nvSpPr>
-          <p:cNvPr id="6" name="TextBox 5">
-            <a:extLst>
-              <a:ext uri="{FF2B5EF4-FFF2-40B4-BE49-F238E27FC236}">
-                <a16:creationId xmlns:a16="http://schemas.microsoft.com/office/drawing/2014/main" id="{F82810A9-36E7-B742-AD19-BA36768B15E6}"/>
+          <p:cNvPr id="7" name="TextBox 6">
+            <a:extLst>
+              <a:ext uri="{FF2B5EF4-FFF2-40B4-BE49-F238E27FC236}">
+                <a16:creationId xmlns:a16="http://schemas.microsoft.com/office/drawing/2014/main" id="{9E186500-037F-0C46-8A32-977586ADC2B0}"/>
               </a:ext>
             </a:extLst>
           </p:cNvPr>
@@ -6771,9 +6962,9 @@
           <p:nvPr/>
         </p:nvSpPr>
         <p:spPr>
-          <a:xfrm rot="16200000">
-            <a:off x="752481" y="3233494"/>
-            <a:ext cx="4199544" cy="369332"/>
+          <a:xfrm>
+            <a:off x="3746941" y="1352787"/>
+            <a:ext cx="1881352" cy="492443"/>
           </a:xfrm>
           <a:prstGeom prst="rect">
             <a:avLst/>
@@ -6786,20 +6977,25 @@
           </a:bodyPr>
           <a:lstStyle/>
           <a:p>
-            <a:pPr algn="ctr"/>
-            <a:r>
-              <a:rPr lang="en-US" dirty="0"/>
-              <a:t>Predicted Probability</a:t>
-            </a:r>
-          </a:p>
-        </p:txBody>
-      </p:sp>
-      <p:sp>
-        <p:nvSpPr>
-          <p:cNvPr id="7" name="TextBox 6">
-            <a:extLst>
-              <a:ext uri="{FF2B5EF4-FFF2-40B4-BE49-F238E27FC236}">
-                <a16:creationId xmlns:a16="http://schemas.microsoft.com/office/drawing/2014/main" id="{9E186500-037F-0C46-8A32-977586ADC2B0}"/>
+            <a:r>
+              <a:rPr lang="en-US" sz="1300" dirty="0"/>
+              <a:t>33% Missing Data</a:t>
+            </a:r>
+          </a:p>
+          <a:p>
+            <a:r>
+              <a:rPr lang="en-US" sz="1300" dirty="0"/>
+              <a:t>0%   Missing Data</a:t>
+            </a:r>
+          </a:p>
+        </p:txBody>
+      </p:sp>
+      <p:sp>
+        <p:nvSpPr>
+          <p:cNvPr id="9" name="TextBox 8">
+            <a:extLst>
+              <a:ext uri="{FF2B5EF4-FFF2-40B4-BE49-F238E27FC236}">
+                <a16:creationId xmlns:a16="http://schemas.microsoft.com/office/drawing/2014/main" id="{F9C789D7-DBE3-4241-956B-C36857F69747}"/>
               </a:ext>
             </a:extLst>
           </p:cNvPr>
@@ -6807,9 +7003,9 @@
           <p:nvPr/>
         </p:nvSpPr>
         <p:spPr>
-          <a:xfrm>
-            <a:off x="3746941" y="1352787"/>
-            <a:ext cx="1881352" cy="492443"/>
+          <a:xfrm rot="16200000">
+            <a:off x="776807" y="3233493"/>
+            <a:ext cx="4199544" cy="369332"/>
           </a:xfrm>
           <a:prstGeom prst="rect">
             <a:avLst/>
@@ -6822,16 +7018,12 @@
           </a:bodyPr>
           <a:lstStyle/>
           <a:p>
-            <a:r>
-              <a:rPr lang="en-US" sz="1300" dirty="0"/>
-              <a:t>33% Missing Data</a:t>
-            </a:r>
-          </a:p>
-          <a:p>
-            <a:r>
-              <a:rPr lang="en-US" sz="1300" dirty="0"/>
-              <a:t>0%   Missing Data</a:t>
-            </a:r>
+            <a:pPr algn="ctr"/>
+            <a:r>
+              <a:rPr lang="en-US" dirty="0" err="1"/>
+              <a:t>p_DEFAULT_NEXT_MONTH</a:t>
+            </a:r>
+            <a:endParaRPr lang="en-US" dirty="0"/>
           </a:p>
         </p:txBody>
       </p:sp>
@@ -6839,6 +7031,1734 @@
     <p:extLst>
       <p:ext uri="{BB962C8B-B14F-4D97-AF65-F5344CB8AC3E}">
         <p14:creationId xmlns:p14="http://schemas.microsoft.com/office/powerpoint/2010/main" val="3964683750"/>
+      </p:ext>
+    </p:extLst>
+  </p:cSld>
+  <p:clrMapOvr>
+    <a:masterClrMapping/>
+  </p:clrMapOvr>
+</p:sld>
+</file>
+
+<file path=ppt/slides/slide7.xml><?xml version="1.0" encoding="utf-8"?>
+<p:sld xmlns:a="http://schemas.openxmlformats.org/drawingml/2006/main" xmlns:r="http://schemas.openxmlformats.org/officeDocument/2006/relationships" xmlns:p="http://schemas.openxmlformats.org/presentationml/2006/main">
+  <p:cSld>
+    <p:spTree>
+      <p:nvGrpSpPr>
+        <p:cNvPr id="1" name=""/>
+        <p:cNvGrpSpPr/>
+        <p:nvPr/>
+      </p:nvGrpSpPr>
+      <p:grpSpPr>
+        <a:xfrm>
+          <a:off x="0" y="0"/>
+          <a:ext cx="0" cy="0"/>
+          <a:chOff x="0" y="0"/>
+          <a:chExt cx="0" cy="0"/>
+        </a:xfrm>
+      </p:grpSpPr>
+      <p:pic>
+        <p:nvPicPr>
+          <p:cNvPr id="3" name="Picture 2">
+            <a:extLst>
+              <a:ext uri="{FF2B5EF4-FFF2-40B4-BE49-F238E27FC236}">
+                <a16:creationId xmlns:a16="http://schemas.microsoft.com/office/drawing/2014/main" id="{BFD784AF-823E-694D-B066-365DAB1FB992}"/>
+              </a:ext>
+            </a:extLst>
+          </p:cNvPr>
+          <p:cNvPicPr>
+            <a:picLocks noChangeAspect="1"/>
+          </p:cNvPicPr>
+          <p:nvPr/>
+        </p:nvPicPr>
+        <p:blipFill>
+          <a:blip r:embed="rId2"/>
+          <a:stretch>
+            <a:fillRect/>
+          </a:stretch>
+        </p:blipFill>
+        <p:spPr>
+          <a:xfrm>
+            <a:off x="-2990" y="1115559"/>
+            <a:ext cx="12194990" cy="4628015"/>
+          </a:xfrm>
+          <a:prstGeom prst="rect">
+            <a:avLst/>
+          </a:prstGeom>
+        </p:spPr>
+      </p:pic>
+      <p:sp>
+        <p:nvSpPr>
+          <p:cNvPr id="4" name="TextBox 3">
+            <a:extLst>
+              <a:ext uri="{FF2B5EF4-FFF2-40B4-BE49-F238E27FC236}">
+                <a16:creationId xmlns:a16="http://schemas.microsoft.com/office/drawing/2014/main" id="{326DD454-1B97-C14C-81B9-93373E62EA0E}"/>
+              </a:ext>
+            </a:extLst>
+          </p:cNvPr>
+          <p:cNvSpPr txBox="1"/>
+          <p:nvPr/>
+        </p:nvSpPr>
+        <p:spPr>
+          <a:xfrm>
+            <a:off x="-285689" y="1431967"/>
+            <a:ext cx="1397875" cy="3777316"/>
+          </a:xfrm>
+          <a:prstGeom prst="rect">
+            <a:avLst/>
+          </a:prstGeom>
+          <a:solidFill>
+            <a:schemeClr val="bg1"/>
+          </a:solidFill>
+        </p:spPr>
+        <p:txBody>
+          <a:bodyPr wrap="square" rtlCol="0">
+            <a:spAutoFit/>
+          </a:bodyPr>
+          <a:lstStyle/>
+          <a:p>
+            <a:pPr algn="r">
+              <a:lnSpc>
+                <a:spcPct val="80000"/>
+              </a:lnSpc>
+            </a:pPr>
+            <a:r>
+              <a:rPr lang="en-US" sz="1300" dirty="0"/>
+              <a:t>PAY_AMT6</a:t>
+            </a:r>
+          </a:p>
+          <a:p>
+            <a:pPr algn="r">
+              <a:lnSpc>
+                <a:spcPct val="80000"/>
+              </a:lnSpc>
+            </a:pPr>
+            <a:r>
+              <a:rPr lang="en-US" sz="1300" dirty="0"/>
+              <a:t>PAY_AMT5</a:t>
+            </a:r>
+          </a:p>
+          <a:p>
+            <a:pPr algn="r">
+              <a:lnSpc>
+                <a:spcPct val="80000"/>
+              </a:lnSpc>
+            </a:pPr>
+            <a:r>
+              <a:rPr lang="en-US" sz="1300" dirty="0"/>
+              <a:t>PAY_AMT4</a:t>
+            </a:r>
+          </a:p>
+          <a:p>
+            <a:pPr algn="r">
+              <a:lnSpc>
+                <a:spcPct val="80000"/>
+              </a:lnSpc>
+            </a:pPr>
+            <a:r>
+              <a:rPr lang="en-US" sz="1300" dirty="0"/>
+              <a:t>PAY_AMT3</a:t>
+            </a:r>
+          </a:p>
+          <a:p>
+            <a:pPr algn="r">
+              <a:lnSpc>
+                <a:spcPct val="80000"/>
+              </a:lnSpc>
+            </a:pPr>
+            <a:r>
+              <a:rPr lang="en-US" sz="1300" dirty="0"/>
+              <a:t>PAY_AMT2</a:t>
+            </a:r>
+          </a:p>
+          <a:p>
+            <a:pPr algn="r">
+              <a:lnSpc>
+                <a:spcPct val="80000"/>
+              </a:lnSpc>
+            </a:pPr>
+            <a:r>
+              <a:rPr lang="en-US" sz="1300" dirty="0"/>
+              <a:t>PAY_AMT1</a:t>
+            </a:r>
+          </a:p>
+          <a:p>
+            <a:pPr algn="r">
+              <a:lnSpc>
+                <a:spcPct val="80000"/>
+              </a:lnSpc>
+            </a:pPr>
+            <a:r>
+              <a:rPr lang="en-US" sz="1300" dirty="0"/>
+              <a:t>BILL_AMT6</a:t>
+            </a:r>
+          </a:p>
+          <a:p>
+            <a:pPr algn="r">
+              <a:lnSpc>
+                <a:spcPct val="80000"/>
+              </a:lnSpc>
+            </a:pPr>
+            <a:r>
+              <a:rPr lang="en-US" sz="1300" dirty="0"/>
+              <a:t>BILL_AMT5</a:t>
+            </a:r>
+          </a:p>
+          <a:p>
+            <a:pPr algn="r">
+              <a:lnSpc>
+                <a:spcPct val="80000"/>
+              </a:lnSpc>
+            </a:pPr>
+            <a:r>
+              <a:rPr lang="en-US" sz="1300" dirty="0"/>
+              <a:t>BILL_AMT4</a:t>
+            </a:r>
+          </a:p>
+          <a:p>
+            <a:pPr algn="r">
+              <a:lnSpc>
+                <a:spcPct val="80000"/>
+              </a:lnSpc>
+            </a:pPr>
+            <a:r>
+              <a:rPr lang="en-US" sz="1300" dirty="0"/>
+              <a:t>BILL_AMT3</a:t>
+            </a:r>
+          </a:p>
+          <a:p>
+            <a:pPr algn="r">
+              <a:lnSpc>
+                <a:spcPct val="80000"/>
+              </a:lnSpc>
+            </a:pPr>
+            <a:r>
+              <a:rPr lang="en-US" sz="1300" dirty="0"/>
+              <a:t>BILL_AMT2</a:t>
+            </a:r>
+          </a:p>
+          <a:p>
+            <a:pPr algn="r">
+              <a:lnSpc>
+                <a:spcPct val="80000"/>
+              </a:lnSpc>
+            </a:pPr>
+            <a:r>
+              <a:rPr lang="en-US" sz="1300" dirty="0"/>
+              <a:t>BILL_AMT1</a:t>
+            </a:r>
+          </a:p>
+          <a:p>
+            <a:pPr algn="r">
+              <a:lnSpc>
+                <a:spcPct val="80000"/>
+              </a:lnSpc>
+            </a:pPr>
+            <a:r>
+              <a:rPr lang="en-US" sz="1300" dirty="0"/>
+              <a:t>PAY_6</a:t>
+            </a:r>
+          </a:p>
+          <a:p>
+            <a:pPr algn="r">
+              <a:lnSpc>
+                <a:spcPct val="80000"/>
+              </a:lnSpc>
+            </a:pPr>
+            <a:r>
+              <a:rPr lang="en-US" sz="1300" dirty="0"/>
+              <a:t>PAY_5</a:t>
+            </a:r>
+          </a:p>
+          <a:p>
+            <a:pPr algn="r">
+              <a:lnSpc>
+                <a:spcPct val="80000"/>
+              </a:lnSpc>
+            </a:pPr>
+            <a:r>
+              <a:rPr lang="en-US" sz="1300" dirty="0"/>
+              <a:t>PAY_4</a:t>
+            </a:r>
+          </a:p>
+          <a:p>
+            <a:pPr algn="r">
+              <a:lnSpc>
+                <a:spcPct val="80000"/>
+              </a:lnSpc>
+            </a:pPr>
+            <a:r>
+              <a:rPr lang="en-US" sz="1300" dirty="0"/>
+              <a:t>PAY_3</a:t>
+            </a:r>
+          </a:p>
+          <a:p>
+            <a:pPr algn="r">
+              <a:lnSpc>
+                <a:spcPct val="80000"/>
+              </a:lnSpc>
+            </a:pPr>
+            <a:r>
+              <a:rPr lang="en-US" sz="1300" dirty="0"/>
+              <a:t>PAY_2</a:t>
+            </a:r>
+          </a:p>
+          <a:p>
+            <a:pPr algn="r">
+              <a:lnSpc>
+                <a:spcPct val="80000"/>
+              </a:lnSpc>
+            </a:pPr>
+            <a:r>
+              <a:rPr lang="en-US" sz="1300" dirty="0"/>
+              <a:t>PAY_0</a:t>
+            </a:r>
+          </a:p>
+          <a:p>
+            <a:pPr algn="r">
+              <a:lnSpc>
+                <a:spcPct val="80000"/>
+              </a:lnSpc>
+            </a:pPr>
+            <a:r>
+              <a:rPr lang="en-US" sz="1300" dirty="0"/>
+              <a:t>AGE</a:t>
+            </a:r>
+          </a:p>
+          <a:p>
+            <a:pPr algn="r">
+              <a:lnSpc>
+                <a:spcPct val="80000"/>
+              </a:lnSpc>
+            </a:pPr>
+            <a:r>
+              <a:rPr lang="en-US" sz="1300" dirty="0"/>
+              <a:t>MARRIAGE</a:t>
+            </a:r>
+          </a:p>
+          <a:p>
+            <a:pPr algn="r">
+              <a:lnSpc>
+                <a:spcPct val="80000"/>
+              </a:lnSpc>
+            </a:pPr>
+            <a:r>
+              <a:rPr lang="en-US" sz="1300" dirty="0"/>
+              <a:t>EDUCATION</a:t>
+            </a:r>
+          </a:p>
+          <a:p>
+            <a:pPr algn="r">
+              <a:lnSpc>
+                <a:spcPct val="80000"/>
+              </a:lnSpc>
+            </a:pPr>
+            <a:r>
+              <a:rPr lang="en-US" sz="1300" dirty="0"/>
+              <a:t>SEX</a:t>
+            </a:r>
+          </a:p>
+          <a:p>
+            <a:pPr algn="r">
+              <a:lnSpc>
+                <a:spcPct val="80000"/>
+              </a:lnSpc>
+            </a:pPr>
+            <a:r>
+              <a:rPr lang="en-US" sz="1300" dirty="0"/>
+              <a:t>LIMIT_BAL</a:t>
+            </a:r>
+          </a:p>
+        </p:txBody>
+      </p:sp>
+      <p:sp>
+        <p:nvSpPr>
+          <p:cNvPr id="5" name="TextBox 4">
+            <a:extLst>
+              <a:ext uri="{FF2B5EF4-FFF2-40B4-BE49-F238E27FC236}">
+                <a16:creationId xmlns:a16="http://schemas.microsoft.com/office/drawing/2014/main" id="{839A23AA-905D-1042-96D1-449404396BAE}"/>
+              </a:ext>
+            </a:extLst>
+          </p:cNvPr>
+          <p:cNvSpPr txBox="1"/>
+          <p:nvPr/>
+        </p:nvSpPr>
+        <p:spPr>
+          <a:xfrm>
+            <a:off x="1112185" y="5474526"/>
+            <a:ext cx="5264863" cy="369332"/>
+          </a:xfrm>
+          <a:prstGeom prst="rect">
+            <a:avLst/>
+          </a:prstGeom>
+          <a:solidFill>
+            <a:schemeClr val="bg1"/>
+          </a:solidFill>
+        </p:spPr>
+        <p:txBody>
+          <a:bodyPr wrap="square" rtlCol="0">
+            <a:spAutoFit/>
+          </a:bodyPr>
+          <a:lstStyle/>
+          <a:p>
+            <a:pPr algn="ctr"/>
+            <a:r>
+              <a:rPr lang="en-US" dirty="0"/>
+              <a:t>Average Shapley Feature Contributions</a:t>
+            </a:r>
+          </a:p>
+        </p:txBody>
+      </p:sp>
+      <p:sp>
+        <p:nvSpPr>
+          <p:cNvPr id="6" name="TextBox 5">
+            <a:extLst>
+              <a:ext uri="{FF2B5EF4-FFF2-40B4-BE49-F238E27FC236}">
+                <a16:creationId xmlns:a16="http://schemas.microsoft.com/office/drawing/2014/main" id="{32219CF4-9F59-1C41-833C-F7A8614BBD4E}"/>
+              </a:ext>
+            </a:extLst>
+          </p:cNvPr>
+          <p:cNvSpPr txBox="1"/>
+          <p:nvPr/>
+        </p:nvSpPr>
+        <p:spPr>
+          <a:xfrm>
+            <a:off x="6778638" y="5474526"/>
+            <a:ext cx="5264863" cy="369332"/>
+          </a:xfrm>
+          <a:prstGeom prst="rect">
+            <a:avLst/>
+          </a:prstGeom>
+          <a:solidFill>
+            <a:schemeClr val="bg1"/>
+          </a:solidFill>
+        </p:spPr>
+        <p:txBody>
+          <a:bodyPr wrap="square" rtlCol="0">
+            <a:spAutoFit/>
+          </a:bodyPr>
+          <a:lstStyle/>
+          <a:p>
+            <a:pPr algn="ctr"/>
+            <a:r>
+              <a:rPr lang="en-US" dirty="0"/>
+              <a:t>Average Shapley Feature Contributions</a:t>
+            </a:r>
+          </a:p>
+        </p:txBody>
+      </p:sp>
+      <p:sp>
+        <p:nvSpPr>
+          <p:cNvPr id="7" name="TextBox 6">
+            <a:extLst>
+              <a:ext uri="{FF2B5EF4-FFF2-40B4-BE49-F238E27FC236}">
+                <a16:creationId xmlns:a16="http://schemas.microsoft.com/office/drawing/2014/main" id="{7C204E10-A54F-5744-9FBC-6845395DA0D0}"/>
+              </a:ext>
+            </a:extLst>
+          </p:cNvPr>
+          <p:cNvSpPr txBox="1"/>
+          <p:nvPr/>
+        </p:nvSpPr>
+        <p:spPr>
+          <a:xfrm>
+            <a:off x="1112184" y="1072113"/>
+            <a:ext cx="5264863" cy="369332"/>
+          </a:xfrm>
+          <a:prstGeom prst="rect">
+            <a:avLst/>
+          </a:prstGeom>
+          <a:solidFill>
+            <a:schemeClr val="bg1"/>
+          </a:solidFill>
+        </p:spPr>
+        <p:txBody>
+          <a:bodyPr wrap="square" rtlCol="0">
+            <a:spAutoFit/>
+          </a:bodyPr>
+          <a:lstStyle/>
+          <a:p>
+            <a:pPr algn="ctr"/>
+            <a:r>
+              <a:rPr lang="en-US" dirty="0"/>
+              <a:t>Low Residual Rows</a:t>
+            </a:r>
+          </a:p>
+        </p:txBody>
+      </p:sp>
+      <p:sp>
+        <p:nvSpPr>
+          <p:cNvPr id="8" name="TextBox 7">
+            <a:extLst>
+              <a:ext uri="{FF2B5EF4-FFF2-40B4-BE49-F238E27FC236}">
+                <a16:creationId xmlns:a16="http://schemas.microsoft.com/office/drawing/2014/main" id="{D4302884-A862-874B-BFB7-1FF5FB003601}"/>
+              </a:ext>
+            </a:extLst>
+          </p:cNvPr>
+          <p:cNvSpPr txBox="1"/>
+          <p:nvPr/>
+        </p:nvSpPr>
+        <p:spPr>
+          <a:xfrm>
+            <a:off x="6927137" y="1067374"/>
+            <a:ext cx="5264863" cy="369332"/>
+          </a:xfrm>
+          <a:prstGeom prst="rect">
+            <a:avLst/>
+          </a:prstGeom>
+          <a:solidFill>
+            <a:schemeClr val="bg1"/>
+          </a:solidFill>
+        </p:spPr>
+        <p:txBody>
+          <a:bodyPr wrap="square" rtlCol="0">
+            <a:spAutoFit/>
+          </a:bodyPr>
+          <a:lstStyle/>
+          <a:p>
+            <a:pPr algn="ctr"/>
+            <a:r>
+              <a:rPr lang="en-US" dirty="0"/>
+              <a:t>High Residual Rows</a:t>
+            </a:r>
+          </a:p>
+        </p:txBody>
+      </p:sp>
+    </p:spTree>
+    <p:extLst>
+      <p:ext uri="{BB962C8B-B14F-4D97-AF65-F5344CB8AC3E}">
+        <p14:creationId xmlns:p14="http://schemas.microsoft.com/office/powerpoint/2010/main" val="3242364506"/>
+      </p:ext>
+    </p:extLst>
+  </p:cSld>
+  <p:clrMapOvr>
+    <a:masterClrMapping/>
+  </p:clrMapOvr>
+</p:sld>
+</file>
+
+<file path=ppt/slides/slide8.xml><?xml version="1.0" encoding="utf-8"?>
+<p:sld xmlns:a="http://schemas.openxmlformats.org/drawingml/2006/main" xmlns:r="http://schemas.openxmlformats.org/officeDocument/2006/relationships" xmlns:p="http://schemas.openxmlformats.org/presentationml/2006/main">
+  <p:cSld>
+    <p:spTree>
+      <p:nvGrpSpPr>
+        <p:cNvPr id="1" name=""/>
+        <p:cNvGrpSpPr/>
+        <p:nvPr/>
+      </p:nvGrpSpPr>
+      <p:grpSpPr>
+        <a:xfrm>
+          <a:off x="0" y="0"/>
+          <a:ext cx="0" cy="0"/>
+          <a:chOff x="0" y="0"/>
+          <a:chExt cx="0" cy="0"/>
+        </a:xfrm>
+      </p:grpSpPr>
+      <p:pic>
+        <p:nvPicPr>
+          <p:cNvPr id="3" name="Picture 2">
+            <a:extLst>
+              <a:ext uri="{FF2B5EF4-FFF2-40B4-BE49-F238E27FC236}">
+                <a16:creationId xmlns:a16="http://schemas.microsoft.com/office/drawing/2014/main" id="{FCC95A3D-B999-724D-8C17-E50C839B0FAD}"/>
+              </a:ext>
+            </a:extLst>
+          </p:cNvPr>
+          <p:cNvPicPr>
+            <a:picLocks noChangeAspect="1"/>
+          </p:cNvPicPr>
+          <p:nvPr/>
+        </p:nvPicPr>
+        <p:blipFill>
+          <a:blip r:embed="rId2"/>
+          <a:stretch>
+            <a:fillRect/>
+          </a:stretch>
+        </p:blipFill>
+        <p:spPr>
+          <a:xfrm>
+            <a:off x="300842" y="616896"/>
+            <a:ext cx="11590317" cy="5624209"/>
+          </a:xfrm>
+          <a:prstGeom prst="rect">
+            <a:avLst/>
+          </a:prstGeom>
+        </p:spPr>
+      </p:pic>
+      <p:sp>
+        <p:nvSpPr>
+          <p:cNvPr id="4" name="TextBox 3">
+            <a:extLst>
+              <a:ext uri="{FF2B5EF4-FFF2-40B4-BE49-F238E27FC236}">
+                <a16:creationId xmlns:a16="http://schemas.microsoft.com/office/drawing/2014/main" id="{C12457FC-68DE-ED44-8675-8DC155CAB686}"/>
+              </a:ext>
+            </a:extLst>
+          </p:cNvPr>
+          <p:cNvSpPr txBox="1"/>
+          <p:nvPr/>
+        </p:nvSpPr>
+        <p:spPr>
+          <a:xfrm>
+            <a:off x="1397875" y="5908881"/>
+            <a:ext cx="4362400" cy="523220"/>
+          </a:xfrm>
+          <a:prstGeom prst="rect">
+            <a:avLst/>
+          </a:prstGeom>
+          <a:solidFill>
+            <a:schemeClr val="bg1"/>
+          </a:solidFill>
+        </p:spPr>
+        <p:txBody>
+          <a:bodyPr wrap="square" rtlCol="0">
+            <a:spAutoFit/>
+          </a:bodyPr>
+          <a:lstStyle/>
+          <a:p>
+            <a:pPr algn="ctr"/>
+            <a:r>
+              <a:rPr lang="en-US" sz="1400" dirty="0"/>
+              <a:t>Mean(|SHAP| value) </a:t>
+            </a:r>
+          </a:p>
+          <a:p>
+            <a:pPr algn="ctr"/>
+            <a:r>
+              <a:rPr lang="en-US" sz="1400" dirty="0"/>
+              <a:t>(average impact on prediction magnitude)</a:t>
+            </a:r>
+          </a:p>
+        </p:txBody>
+      </p:sp>
+      <p:sp>
+        <p:nvSpPr>
+          <p:cNvPr id="5" name="TextBox 4">
+            <a:extLst>
+              <a:ext uri="{FF2B5EF4-FFF2-40B4-BE49-F238E27FC236}">
+                <a16:creationId xmlns:a16="http://schemas.microsoft.com/office/drawing/2014/main" id="{C63D410D-B7EC-A64E-ACC2-CA7AC3E6872F}"/>
+              </a:ext>
+            </a:extLst>
+          </p:cNvPr>
+          <p:cNvSpPr txBox="1"/>
+          <p:nvPr/>
+        </p:nvSpPr>
+        <p:spPr>
+          <a:xfrm>
+            <a:off x="7513808" y="5908881"/>
+            <a:ext cx="4195263" cy="523220"/>
+          </a:xfrm>
+          <a:prstGeom prst="rect">
+            <a:avLst/>
+          </a:prstGeom>
+          <a:solidFill>
+            <a:schemeClr val="bg1"/>
+          </a:solidFill>
+        </p:spPr>
+        <p:txBody>
+          <a:bodyPr wrap="square" rtlCol="0">
+            <a:spAutoFit/>
+          </a:bodyPr>
+          <a:lstStyle/>
+          <a:p>
+            <a:pPr algn="ctr"/>
+            <a:r>
+              <a:rPr lang="en-US" sz="1400" dirty="0"/>
+              <a:t>Mean(|SHAP| value) </a:t>
+            </a:r>
+          </a:p>
+          <a:p>
+            <a:pPr algn="ctr"/>
+            <a:r>
+              <a:rPr lang="en-US" sz="1400" dirty="0"/>
+              <a:t>(average impact on </a:t>
+            </a:r>
+            <a:r>
+              <a:rPr lang="en-US" sz="1400" dirty="0" err="1"/>
+              <a:t>logloss</a:t>
+            </a:r>
+            <a:r>
+              <a:rPr lang="en-US" sz="1400" dirty="0"/>
+              <a:t> magnitude)</a:t>
+            </a:r>
+          </a:p>
+        </p:txBody>
+      </p:sp>
+      <p:sp>
+        <p:nvSpPr>
+          <p:cNvPr id="7" name="TextBox 6">
+            <a:extLst>
+              <a:ext uri="{FF2B5EF4-FFF2-40B4-BE49-F238E27FC236}">
+                <a16:creationId xmlns:a16="http://schemas.microsoft.com/office/drawing/2014/main" id="{E6053391-2C97-D642-89ED-CA9A3091FDDE}"/>
+              </a:ext>
+            </a:extLst>
+          </p:cNvPr>
+          <p:cNvSpPr txBox="1"/>
+          <p:nvPr/>
+        </p:nvSpPr>
+        <p:spPr>
+          <a:xfrm>
+            <a:off x="0" y="948438"/>
+            <a:ext cx="1397875" cy="4769447"/>
+          </a:xfrm>
+          <a:prstGeom prst="rect">
+            <a:avLst/>
+          </a:prstGeom>
+          <a:solidFill>
+            <a:schemeClr val="bg1"/>
+          </a:solidFill>
+        </p:spPr>
+        <p:txBody>
+          <a:bodyPr wrap="square" rtlCol="0">
+            <a:spAutoFit/>
+          </a:bodyPr>
+          <a:lstStyle/>
+          <a:p>
+            <a:pPr algn="r">
+              <a:lnSpc>
+                <a:spcPct val="80000"/>
+              </a:lnSpc>
+            </a:pPr>
+            <a:r>
+              <a:rPr lang="en-US" sz="1650" dirty="0"/>
+              <a:t>PAY_0</a:t>
+            </a:r>
+          </a:p>
+          <a:p>
+            <a:pPr algn="r">
+              <a:lnSpc>
+                <a:spcPct val="80000"/>
+              </a:lnSpc>
+            </a:pPr>
+            <a:r>
+              <a:rPr lang="en-US" sz="1650" dirty="0"/>
+              <a:t>LIMIT_BAL</a:t>
+            </a:r>
+          </a:p>
+          <a:p>
+            <a:pPr algn="r">
+              <a:lnSpc>
+                <a:spcPct val="80000"/>
+              </a:lnSpc>
+            </a:pPr>
+            <a:r>
+              <a:rPr lang="en-US" sz="1650" dirty="0"/>
+              <a:t>PAY_AMT3</a:t>
+            </a:r>
+          </a:p>
+          <a:p>
+            <a:pPr algn="r">
+              <a:lnSpc>
+                <a:spcPct val="80000"/>
+              </a:lnSpc>
+            </a:pPr>
+            <a:r>
+              <a:rPr lang="en-US" sz="1650" dirty="0"/>
+              <a:t>BILL_AMT1</a:t>
+            </a:r>
+          </a:p>
+          <a:p>
+            <a:pPr algn="r">
+              <a:lnSpc>
+                <a:spcPct val="80000"/>
+              </a:lnSpc>
+            </a:pPr>
+            <a:r>
+              <a:rPr lang="en-US" sz="1650" dirty="0"/>
+              <a:t>PAY_AMT2</a:t>
+            </a:r>
+          </a:p>
+          <a:p>
+            <a:pPr algn="r">
+              <a:lnSpc>
+                <a:spcPct val="80000"/>
+              </a:lnSpc>
+            </a:pPr>
+            <a:r>
+              <a:rPr lang="en-US" sz="1650" dirty="0"/>
+              <a:t>PAY_2</a:t>
+            </a:r>
+          </a:p>
+          <a:p>
+            <a:pPr algn="r">
+              <a:lnSpc>
+                <a:spcPct val="80000"/>
+              </a:lnSpc>
+            </a:pPr>
+            <a:r>
+              <a:rPr lang="en-US" sz="1650" dirty="0"/>
+              <a:t>PAY_3</a:t>
+            </a:r>
+          </a:p>
+          <a:p>
+            <a:pPr algn="r">
+              <a:lnSpc>
+                <a:spcPct val="80000"/>
+              </a:lnSpc>
+            </a:pPr>
+            <a:r>
+              <a:rPr lang="en-US" sz="1650" dirty="0"/>
+              <a:t>PAY_AMT1</a:t>
+            </a:r>
+          </a:p>
+          <a:p>
+            <a:pPr algn="r">
+              <a:lnSpc>
+                <a:spcPct val="80000"/>
+              </a:lnSpc>
+            </a:pPr>
+            <a:r>
+              <a:rPr lang="en-US" sz="1650" dirty="0"/>
+              <a:t>PAY_5</a:t>
+            </a:r>
+          </a:p>
+          <a:p>
+            <a:pPr algn="r">
+              <a:lnSpc>
+                <a:spcPct val="80000"/>
+              </a:lnSpc>
+            </a:pPr>
+            <a:r>
+              <a:rPr lang="en-US" sz="1650" dirty="0"/>
+              <a:t>PAY_6</a:t>
+            </a:r>
+          </a:p>
+          <a:p>
+            <a:pPr algn="r">
+              <a:lnSpc>
+                <a:spcPct val="80000"/>
+              </a:lnSpc>
+            </a:pPr>
+            <a:r>
+              <a:rPr lang="en-US" sz="1650" dirty="0"/>
+              <a:t>AGE</a:t>
+            </a:r>
+          </a:p>
+          <a:p>
+            <a:pPr algn="r">
+              <a:lnSpc>
+                <a:spcPct val="80000"/>
+              </a:lnSpc>
+            </a:pPr>
+            <a:r>
+              <a:rPr lang="en-US" sz="1650" dirty="0"/>
+              <a:t>PAY_4</a:t>
+            </a:r>
+          </a:p>
+          <a:p>
+            <a:pPr algn="r">
+              <a:lnSpc>
+                <a:spcPct val="80000"/>
+              </a:lnSpc>
+            </a:pPr>
+            <a:r>
+              <a:rPr lang="en-US" sz="1650" dirty="0"/>
+              <a:t>MARRIAGE</a:t>
+            </a:r>
+          </a:p>
+          <a:p>
+            <a:pPr algn="r">
+              <a:lnSpc>
+                <a:spcPct val="80000"/>
+              </a:lnSpc>
+            </a:pPr>
+            <a:r>
+              <a:rPr lang="en-US" sz="1650" dirty="0"/>
+              <a:t>SEX</a:t>
+            </a:r>
+          </a:p>
+          <a:p>
+            <a:pPr algn="r">
+              <a:lnSpc>
+                <a:spcPct val="80000"/>
+              </a:lnSpc>
+            </a:pPr>
+            <a:r>
+              <a:rPr lang="en-US" sz="1650" dirty="0"/>
+              <a:t>PAY_AMT4</a:t>
+            </a:r>
+          </a:p>
+          <a:p>
+            <a:pPr algn="r">
+              <a:lnSpc>
+                <a:spcPct val="80000"/>
+              </a:lnSpc>
+            </a:pPr>
+            <a:r>
+              <a:rPr lang="en-US" sz="1650" dirty="0"/>
+              <a:t>PAY_AMT6</a:t>
+            </a:r>
+          </a:p>
+          <a:p>
+            <a:pPr algn="r">
+              <a:lnSpc>
+                <a:spcPct val="80000"/>
+              </a:lnSpc>
+            </a:pPr>
+            <a:r>
+              <a:rPr lang="en-US" sz="1650" dirty="0"/>
+              <a:t>PAY_AMT5</a:t>
+            </a:r>
+          </a:p>
+          <a:p>
+            <a:pPr algn="r">
+              <a:lnSpc>
+                <a:spcPct val="80000"/>
+              </a:lnSpc>
+            </a:pPr>
+            <a:r>
+              <a:rPr lang="en-US" sz="1650" dirty="0"/>
+              <a:t>EDUCATION</a:t>
+            </a:r>
+          </a:p>
+          <a:p>
+            <a:pPr algn="r">
+              <a:lnSpc>
+                <a:spcPct val="80000"/>
+              </a:lnSpc>
+            </a:pPr>
+            <a:r>
+              <a:rPr lang="en-US" sz="1650" dirty="0"/>
+              <a:t>BILL_AMT2</a:t>
+            </a:r>
+          </a:p>
+          <a:p>
+            <a:pPr algn="r">
+              <a:lnSpc>
+                <a:spcPct val="80000"/>
+              </a:lnSpc>
+            </a:pPr>
+            <a:r>
+              <a:rPr lang="en-US" sz="1650" dirty="0"/>
+              <a:t>BILL_AMT5</a:t>
+            </a:r>
+          </a:p>
+          <a:p>
+            <a:pPr algn="r">
+              <a:lnSpc>
+                <a:spcPct val="80000"/>
+              </a:lnSpc>
+            </a:pPr>
+            <a:r>
+              <a:rPr lang="en-US" sz="1650" dirty="0"/>
+              <a:t>BILL_AMT6</a:t>
+            </a:r>
+          </a:p>
+          <a:p>
+            <a:pPr algn="r">
+              <a:lnSpc>
+                <a:spcPct val="80000"/>
+              </a:lnSpc>
+            </a:pPr>
+            <a:r>
+              <a:rPr lang="en-US" sz="1650" dirty="0"/>
+              <a:t>BILL_AMT4</a:t>
+            </a:r>
+          </a:p>
+          <a:p>
+            <a:pPr algn="r">
+              <a:lnSpc>
+                <a:spcPct val="80000"/>
+              </a:lnSpc>
+            </a:pPr>
+            <a:r>
+              <a:rPr lang="en-US" sz="1650" dirty="0"/>
+              <a:t>BILL_AMT3</a:t>
+            </a:r>
+          </a:p>
+        </p:txBody>
+      </p:sp>
+      <p:sp>
+        <p:nvSpPr>
+          <p:cNvPr id="8" name="TextBox 7">
+            <a:extLst>
+              <a:ext uri="{FF2B5EF4-FFF2-40B4-BE49-F238E27FC236}">
+                <a16:creationId xmlns:a16="http://schemas.microsoft.com/office/drawing/2014/main" id="{23AAF93C-BA14-FE40-A6FA-422D82CF4F31}"/>
+              </a:ext>
+            </a:extLst>
+          </p:cNvPr>
+          <p:cNvSpPr txBox="1"/>
+          <p:nvPr/>
+        </p:nvSpPr>
+        <p:spPr>
+          <a:xfrm>
+            <a:off x="5966057" y="948438"/>
+            <a:ext cx="1397875" cy="4769447"/>
+          </a:xfrm>
+          <a:prstGeom prst="rect">
+            <a:avLst/>
+          </a:prstGeom>
+          <a:solidFill>
+            <a:schemeClr val="bg1"/>
+          </a:solidFill>
+        </p:spPr>
+        <p:txBody>
+          <a:bodyPr wrap="square" rtlCol="0">
+            <a:spAutoFit/>
+          </a:bodyPr>
+          <a:lstStyle/>
+          <a:p>
+            <a:pPr algn="r">
+              <a:lnSpc>
+                <a:spcPct val="80000"/>
+              </a:lnSpc>
+            </a:pPr>
+            <a:r>
+              <a:rPr lang="en-US" sz="1650" dirty="0"/>
+              <a:t>PAY_0</a:t>
+            </a:r>
+          </a:p>
+          <a:p>
+            <a:pPr algn="r">
+              <a:lnSpc>
+                <a:spcPct val="80000"/>
+              </a:lnSpc>
+            </a:pPr>
+            <a:r>
+              <a:rPr lang="en-US" sz="1650" dirty="0"/>
+              <a:t>PAY_3</a:t>
+            </a:r>
+          </a:p>
+          <a:p>
+            <a:pPr algn="r">
+              <a:lnSpc>
+                <a:spcPct val="80000"/>
+              </a:lnSpc>
+            </a:pPr>
+            <a:r>
+              <a:rPr lang="en-US" sz="1650" dirty="0"/>
+              <a:t>PAY_2</a:t>
+            </a:r>
+          </a:p>
+          <a:p>
+            <a:pPr algn="r">
+              <a:lnSpc>
+                <a:spcPct val="80000"/>
+              </a:lnSpc>
+            </a:pPr>
+            <a:r>
+              <a:rPr lang="en-US" sz="1650" dirty="0"/>
+              <a:t>LIMIT_BAL</a:t>
+            </a:r>
+          </a:p>
+          <a:p>
+            <a:pPr algn="r">
+              <a:lnSpc>
+                <a:spcPct val="80000"/>
+              </a:lnSpc>
+            </a:pPr>
+            <a:r>
+              <a:rPr lang="en-US" sz="1650" dirty="0"/>
+              <a:t>BILL_AMT1</a:t>
+            </a:r>
+          </a:p>
+          <a:p>
+            <a:pPr algn="r">
+              <a:lnSpc>
+                <a:spcPct val="80000"/>
+              </a:lnSpc>
+            </a:pPr>
+            <a:r>
+              <a:rPr lang="en-US" sz="1650" dirty="0"/>
+              <a:t>PAY_AMT3</a:t>
+            </a:r>
+          </a:p>
+          <a:p>
+            <a:pPr algn="r">
+              <a:lnSpc>
+                <a:spcPct val="80000"/>
+              </a:lnSpc>
+            </a:pPr>
+            <a:r>
+              <a:rPr lang="en-US" sz="1650" dirty="0"/>
+              <a:t>PAY_5</a:t>
+            </a:r>
+          </a:p>
+          <a:p>
+            <a:pPr algn="r">
+              <a:lnSpc>
+                <a:spcPct val="80000"/>
+              </a:lnSpc>
+            </a:pPr>
+            <a:r>
+              <a:rPr lang="en-US" sz="1650" dirty="0"/>
+              <a:t>PAY_AMT2</a:t>
+            </a:r>
+          </a:p>
+          <a:p>
+            <a:pPr algn="r">
+              <a:lnSpc>
+                <a:spcPct val="80000"/>
+              </a:lnSpc>
+            </a:pPr>
+            <a:r>
+              <a:rPr lang="en-US" sz="1650" dirty="0"/>
+              <a:t>PAY_6</a:t>
+            </a:r>
+          </a:p>
+          <a:p>
+            <a:pPr algn="r">
+              <a:lnSpc>
+                <a:spcPct val="80000"/>
+              </a:lnSpc>
+            </a:pPr>
+            <a:r>
+              <a:rPr lang="en-US" sz="1650" dirty="0"/>
+              <a:t>PAY_4</a:t>
+            </a:r>
+          </a:p>
+          <a:p>
+            <a:pPr algn="r">
+              <a:lnSpc>
+                <a:spcPct val="80000"/>
+              </a:lnSpc>
+            </a:pPr>
+            <a:r>
+              <a:rPr lang="en-US" sz="1650" dirty="0"/>
+              <a:t>MARRIAGE</a:t>
+            </a:r>
+          </a:p>
+          <a:p>
+            <a:pPr algn="r">
+              <a:lnSpc>
+                <a:spcPct val="80000"/>
+              </a:lnSpc>
+            </a:pPr>
+            <a:r>
+              <a:rPr lang="en-US" sz="1650" dirty="0"/>
+              <a:t>PAY_AMT1</a:t>
+            </a:r>
+          </a:p>
+          <a:p>
+            <a:pPr algn="r">
+              <a:lnSpc>
+                <a:spcPct val="80000"/>
+              </a:lnSpc>
+            </a:pPr>
+            <a:r>
+              <a:rPr lang="en-US" sz="1650" dirty="0"/>
+              <a:t>AGE</a:t>
+            </a:r>
+          </a:p>
+          <a:p>
+            <a:pPr algn="r">
+              <a:lnSpc>
+                <a:spcPct val="80000"/>
+              </a:lnSpc>
+            </a:pPr>
+            <a:r>
+              <a:rPr lang="en-US" sz="1650" dirty="0"/>
+              <a:t>SEX</a:t>
+            </a:r>
+          </a:p>
+          <a:p>
+            <a:pPr algn="r">
+              <a:lnSpc>
+                <a:spcPct val="80000"/>
+              </a:lnSpc>
+            </a:pPr>
+            <a:r>
+              <a:rPr lang="en-US" sz="1650" dirty="0"/>
+              <a:t>PAY_AMT4</a:t>
+            </a:r>
+          </a:p>
+          <a:p>
+            <a:pPr algn="r">
+              <a:lnSpc>
+                <a:spcPct val="80000"/>
+              </a:lnSpc>
+            </a:pPr>
+            <a:r>
+              <a:rPr lang="en-US" sz="1650" dirty="0"/>
+              <a:t>PAY_AMT6</a:t>
+            </a:r>
+          </a:p>
+          <a:p>
+            <a:pPr algn="r">
+              <a:lnSpc>
+                <a:spcPct val="80000"/>
+              </a:lnSpc>
+            </a:pPr>
+            <a:r>
+              <a:rPr lang="en-US" sz="1650" dirty="0"/>
+              <a:t>BILL_AMT2</a:t>
+            </a:r>
+          </a:p>
+          <a:p>
+            <a:pPr algn="r">
+              <a:lnSpc>
+                <a:spcPct val="80000"/>
+              </a:lnSpc>
+            </a:pPr>
+            <a:r>
+              <a:rPr lang="en-US" sz="1650" dirty="0"/>
+              <a:t>PAY_AMT5</a:t>
+            </a:r>
+          </a:p>
+          <a:p>
+            <a:pPr algn="r">
+              <a:lnSpc>
+                <a:spcPct val="80000"/>
+              </a:lnSpc>
+            </a:pPr>
+            <a:r>
+              <a:rPr lang="en-US" sz="1650" dirty="0"/>
+              <a:t>EDUCATION</a:t>
+            </a:r>
+          </a:p>
+          <a:p>
+            <a:pPr algn="r">
+              <a:lnSpc>
+                <a:spcPct val="80000"/>
+              </a:lnSpc>
+            </a:pPr>
+            <a:r>
+              <a:rPr lang="en-US" sz="1650" dirty="0"/>
+              <a:t>BILL_AMT5</a:t>
+            </a:r>
+          </a:p>
+          <a:p>
+            <a:pPr algn="r">
+              <a:lnSpc>
+                <a:spcPct val="80000"/>
+              </a:lnSpc>
+            </a:pPr>
+            <a:r>
+              <a:rPr lang="en-US" sz="1650" dirty="0"/>
+              <a:t>BILL_AMT6</a:t>
+            </a:r>
+          </a:p>
+          <a:p>
+            <a:pPr algn="r">
+              <a:lnSpc>
+                <a:spcPct val="80000"/>
+              </a:lnSpc>
+            </a:pPr>
+            <a:r>
+              <a:rPr lang="en-US" sz="1650" dirty="0"/>
+              <a:t>BILL_AMT3</a:t>
+            </a:r>
+          </a:p>
+          <a:p>
+            <a:pPr algn="r">
+              <a:lnSpc>
+                <a:spcPct val="80000"/>
+              </a:lnSpc>
+            </a:pPr>
+            <a:r>
+              <a:rPr lang="en-US" sz="1650" dirty="0"/>
+              <a:t>BILL_AMT4</a:t>
+            </a:r>
+          </a:p>
+        </p:txBody>
+      </p:sp>
+      <p:sp>
+        <p:nvSpPr>
+          <p:cNvPr id="9" name="TextBox 8">
+            <a:extLst>
+              <a:ext uri="{FF2B5EF4-FFF2-40B4-BE49-F238E27FC236}">
+                <a16:creationId xmlns:a16="http://schemas.microsoft.com/office/drawing/2014/main" id="{66154E63-CE2C-FA44-ABA0-3D1BC3368533}"/>
+              </a:ext>
+            </a:extLst>
+          </p:cNvPr>
+          <p:cNvSpPr txBox="1"/>
+          <p:nvPr/>
+        </p:nvSpPr>
+        <p:spPr>
+          <a:xfrm>
+            <a:off x="1397875" y="616896"/>
+            <a:ext cx="4362400" cy="338554"/>
+          </a:xfrm>
+          <a:prstGeom prst="rect">
+            <a:avLst/>
+          </a:prstGeom>
+          <a:solidFill>
+            <a:schemeClr val="bg1"/>
+          </a:solidFill>
+        </p:spPr>
+        <p:txBody>
+          <a:bodyPr wrap="square" rtlCol="0">
+            <a:spAutoFit/>
+          </a:bodyPr>
+          <a:lstStyle/>
+          <a:p>
+            <a:pPr algn="ctr"/>
+            <a:r>
+              <a:rPr lang="en-US" sz="1600" dirty="0"/>
+              <a:t>Global Shapley Feature Importance for Predictions</a:t>
+            </a:r>
+          </a:p>
+        </p:txBody>
+      </p:sp>
+      <p:sp>
+        <p:nvSpPr>
+          <p:cNvPr id="10" name="TextBox 9">
+            <a:extLst>
+              <a:ext uri="{FF2B5EF4-FFF2-40B4-BE49-F238E27FC236}">
+                <a16:creationId xmlns:a16="http://schemas.microsoft.com/office/drawing/2014/main" id="{17152130-B0E4-6349-A7CB-D7AC90D00C2B}"/>
+              </a:ext>
+            </a:extLst>
+          </p:cNvPr>
+          <p:cNvSpPr txBox="1"/>
+          <p:nvPr/>
+        </p:nvSpPr>
+        <p:spPr>
+          <a:xfrm>
+            <a:off x="7363932" y="616896"/>
+            <a:ext cx="4362400" cy="338554"/>
+          </a:xfrm>
+          <a:prstGeom prst="rect">
+            <a:avLst/>
+          </a:prstGeom>
+          <a:solidFill>
+            <a:schemeClr val="bg1"/>
+          </a:solidFill>
+        </p:spPr>
+        <p:txBody>
+          <a:bodyPr wrap="square" rtlCol="0">
+            <a:spAutoFit/>
+          </a:bodyPr>
+          <a:lstStyle/>
+          <a:p>
+            <a:pPr algn="ctr"/>
+            <a:r>
+              <a:rPr lang="en-US" sz="1600" dirty="0"/>
+              <a:t>Global Shapley Feature Importance for </a:t>
+            </a:r>
+            <a:r>
+              <a:rPr lang="en-US" sz="1600" dirty="0" err="1"/>
+              <a:t>Logloss</a:t>
+            </a:r>
+            <a:endParaRPr lang="en-US" sz="1600" dirty="0"/>
+          </a:p>
+        </p:txBody>
+      </p:sp>
+    </p:spTree>
+    <p:extLst>
+      <p:ext uri="{BB962C8B-B14F-4D97-AF65-F5344CB8AC3E}">
+        <p14:creationId xmlns:p14="http://schemas.microsoft.com/office/powerpoint/2010/main" val="3524314082"/>
+      </p:ext>
+    </p:extLst>
+  </p:cSld>
+  <p:clrMapOvr>
+    <a:masterClrMapping/>
+  </p:clrMapOvr>
+</p:sld>
+</file>
+
+<file path=ppt/slides/slide9.xml><?xml version="1.0" encoding="utf-8"?>
+<p:sld xmlns:a="http://schemas.openxmlformats.org/drawingml/2006/main" xmlns:r="http://schemas.openxmlformats.org/officeDocument/2006/relationships" xmlns:p="http://schemas.openxmlformats.org/presentationml/2006/main">
+  <p:cSld>
+    <p:spTree>
+      <p:nvGrpSpPr>
+        <p:cNvPr id="1" name=""/>
+        <p:cNvGrpSpPr/>
+        <p:nvPr/>
+      </p:nvGrpSpPr>
+      <p:grpSpPr>
+        <a:xfrm>
+          <a:off x="0" y="0"/>
+          <a:ext cx="0" cy="0"/>
+          <a:chOff x="0" y="0"/>
+          <a:chExt cx="0" cy="0"/>
+        </a:xfrm>
+      </p:grpSpPr>
+      <p:pic>
+        <p:nvPicPr>
+          <p:cNvPr id="3" name="Picture 2">
+            <a:extLst>
+              <a:ext uri="{FF2B5EF4-FFF2-40B4-BE49-F238E27FC236}">
+                <a16:creationId xmlns:a16="http://schemas.microsoft.com/office/drawing/2014/main" id="{3DCE8244-E336-E14C-91C9-25635005D680}"/>
+              </a:ext>
+            </a:extLst>
+          </p:cNvPr>
+          <p:cNvPicPr>
+            <a:picLocks noChangeAspect="1"/>
+          </p:cNvPicPr>
+          <p:nvPr/>
+        </p:nvPicPr>
+        <p:blipFill>
+          <a:blip r:embed="rId2"/>
+          <a:stretch>
+            <a:fillRect/>
+          </a:stretch>
+        </p:blipFill>
+        <p:spPr>
+          <a:xfrm>
+            <a:off x="2651315" y="600075"/>
+            <a:ext cx="6471832" cy="5314950"/>
+          </a:xfrm>
+          <a:prstGeom prst="rect">
+            <a:avLst/>
+          </a:prstGeom>
+        </p:spPr>
+      </p:pic>
+      <p:sp>
+        <p:nvSpPr>
+          <p:cNvPr id="4" name="TextBox 3">
+            <a:extLst>
+              <a:ext uri="{FF2B5EF4-FFF2-40B4-BE49-F238E27FC236}">
+                <a16:creationId xmlns:a16="http://schemas.microsoft.com/office/drawing/2014/main" id="{527C26BB-A62B-6445-B4F0-15DCBA98BA27}"/>
+              </a:ext>
+            </a:extLst>
+          </p:cNvPr>
+          <p:cNvSpPr txBox="1"/>
+          <p:nvPr/>
+        </p:nvSpPr>
+        <p:spPr>
+          <a:xfrm rot="16200000">
+            <a:off x="5609067" y="2636969"/>
+            <a:ext cx="1397875" cy="5844036"/>
+          </a:xfrm>
+          <a:prstGeom prst="rect">
+            <a:avLst/>
+          </a:prstGeom>
+          <a:solidFill>
+            <a:schemeClr val="bg1"/>
+          </a:solidFill>
+        </p:spPr>
+        <p:txBody>
+          <a:bodyPr wrap="square" rtlCol="0">
+            <a:spAutoFit/>
+          </a:bodyPr>
+          <a:lstStyle/>
+          <a:p>
+            <a:pPr algn="r">
+              <a:lnSpc>
+                <a:spcPct val="81000"/>
+              </a:lnSpc>
+            </a:pPr>
+            <a:r>
+              <a:rPr lang="en-US" sz="1980" dirty="0"/>
+              <a:t>PAY_AMT1</a:t>
+            </a:r>
+          </a:p>
+          <a:p>
+            <a:pPr algn="r">
+              <a:lnSpc>
+                <a:spcPct val="81000"/>
+              </a:lnSpc>
+            </a:pPr>
+            <a:r>
+              <a:rPr lang="en-US" sz="1980" dirty="0"/>
+              <a:t>LIMIT_BAL</a:t>
+            </a:r>
+          </a:p>
+          <a:p>
+            <a:pPr algn="r">
+              <a:lnSpc>
+                <a:spcPct val="81000"/>
+              </a:lnSpc>
+            </a:pPr>
+            <a:r>
+              <a:rPr lang="en-US" sz="1980" dirty="0"/>
+              <a:t>PAY_AMT2</a:t>
+            </a:r>
+          </a:p>
+          <a:p>
+            <a:pPr algn="r">
+              <a:lnSpc>
+                <a:spcPct val="81000"/>
+              </a:lnSpc>
+            </a:pPr>
+            <a:r>
+              <a:rPr lang="en-US" sz="1980" dirty="0"/>
+              <a:t>PAY_0</a:t>
+            </a:r>
+          </a:p>
+          <a:p>
+            <a:pPr algn="r">
+              <a:lnSpc>
+                <a:spcPct val="81000"/>
+              </a:lnSpc>
+            </a:pPr>
+            <a:r>
+              <a:rPr lang="en-US" sz="1980" dirty="0"/>
+              <a:t>PAY_3</a:t>
+            </a:r>
+          </a:p>
+          <a:p>
+            <a:pPr algn="r">
+              <a:lnSpc>
+                <a:spcPct val="81000"/>
+              </a:lnSpc>
+            </a:pPr>
+            <a:r>
+              <a:rPr lang="en-US" sz="1980" dirty="0"/>
+              <a:t>PAY_AMT3</a:t>
+            </a:r>
+          </a:p>
+          <a:p>
+            <a:pPr algn="r">
+              <a:lnSpc>
+                <a:spcPct val="81000"/>
+              </a:lnSpc>
+            </a:pPr>
+            <a:r>
+              <a:rPr lang="en-US" sz="1980" dirty="0"/>
+              <a:t>PAY_6</a:t>
+            </a:r>
+          </a:p>
+          <a:p>
+            <a:pPr algn="r">
+              <a:lnSpc>
+                <a:spcPct val="81000"/>
+              </a:lnSpc>
+            </a:pPr>
+            <a:r>
+              <a:rPr lang="en-US" sz="1980" dirty="0"/>
+              <a:t>PAY_2</a:t>
+            </a:r>
+          </a:p>
+          <a:p>
+            <a:pPr algn="r">
+              <a:lnSpc>
+                <a:spcPct val="81000"/>
+              </a:lnSpc>
+            </a:pPr>
+            <a:r>
+              <a:rPr lang="en-US" sz="1980" dirty="0"/>
+              <a:t>BILL_AMT1</a:t>
+            </a:r>
+          </a:p>
+          <a:p>
+            <a:pPr algn="r">
+              <a:lnSpc>
+                <a:spcPct val="81000"/>
+              </a:lnSpc>
+            </a:pPr>
+            <a:r>
+              <a:rPr lang="en-US" sz="1980" dirty="0"/>
+              <a:t>MARRIAGE</a:t>
+            </a:r>
+          </a:p>
+          <a:p>
+            <a:pPr algn="r">
+              <a:lnSpc>
+                <a:spcPct val="81000"/>
+              </a:lnSpc>
+            </a:pPr>
+            <a:r>
+              <a:rPr lang="en-US" sz="1980" dirty="0"/>
+              <a:t>PAY_5</a:t>
+            </a:r>
+          </a:p>
+          <a:p>
+            <a:pPr algn="r">
+              <a:lnSpc>
+                <a:spcPct val="81000"/>
+              </a:lnSpc>
+            </a:pPr>
+            <a:r>
+              <a:rPr lang="en-US" sz="1980" dirty="0"/>
+              <a:t>PAY_AMT5</a:t>
+            </a:r>
+          </a:p>
+          <a:p>
+            <a:pPr algn="r">
+              <a:lnSpc>
+                <a:spcPct val="81000"/>
+              </a:lnSpc>
+            </a:pPr>
+            <a:r>
+              <a:rPr lang="en-US" sz="1980" dirty="0"/>
+              <a:t>PAY_AMT6</a:t>
+            </a:r>
+          </a:p>
+          <a:p>
+            <a:pPr algn="r">
+              <a:lnSpc>
+                <a:spcPct val="81000"/>
+              </a:lnSpc>
+            </a:pPr>
+            <a:r>
+              <a:rPr lang="en-US" sz="1980" dirty="0"/>
+              <a:t>PAY_4</a:t>
+            </a:r>
+          </a:p>
+          <a:p>
+            <a:pPr algn="r">
+              <a:lnSpc>
+                <a:spcPct val="81000"/>
+              </a:lnSpc>
+            </a:pPr>
+            <a:r>
+              <a:rPr lang="en-US" sz="1980" dirty="0"/>
+              <a:t>BILL_AMT2</a:t>
+            </a:r>
+          </a:p>
+          <a:p>
+            <a:pPr algn="r">
+              <a:lnSpc>
+                <a:spcPct val="81000"/>
+              </a:lnSpc>
+            </a:pPr>
+            <a:r>
+              <a:rPr lang="en-US" sz="1980" dirty="0"/>
+              <a:t>EDUCATION</a:t>
+            </a:r>
+          </a:p>
+          <a:p>
+            <a:pPr algn="r">
+              <a:lnSpc>
+                <a:spcPct val="81000"/>
+              </a:lnSpc>
+            </a:pPr>
+            <a:r>
+              <a:rPr lang="en-US" sz="1980" dirty="0"/>
+              <a:t>PAY_AMT4</a:t>
+            </a:r>
+          </a:p>
+          <a:p>
+            <a:pPr algn="r">
+              <a:lnSpc>
+                <a:spcPct val="81000"/>
+              </a:lnSpc>
+            </a:pPr>
+            <a:r>
+              <a:rPr lang="en-US" sz="1980" dirty="0"/>
+              <a:t>BILL_AMT4</a:t>
+            </a:r>
+          </a:p>
+          <a:p>
+            <a:pPr algn="r">
+              <a:lnSpc>
+                <a:spcPct val="81000"/>
+              </a:lnSpc>
+            </a:pPr>
+            <a:r>
+              <a:rPr lang="en-US" sz="1980" dirty="0"/>
+              <a:t>BILL_AMT6</a:t>
+            </a:r>
+          </a:p>
+          <a:p>
+            <a:pPr algn="r">
+              <a:lnSpc>
+                <a:spcPct val="81000"/>
+              </a:lnSpc>
+            </a:pPr>
+            <a:r>
+              <a:rPr lang="en-US" sz="1980" dirty="0"/>
+              <a:t>BILL_AMT5</a:t>
+            </a:r>
+          </a:p>
+          <a:p>
+            <a:pPr algn="r">
+              <a:lnSpc>
+                <a:spcPct val="81000"/>
+              </a:lnSpc>
+            </a:pPr>
+            <a:r>
+              <a:rPr lang="en-US" sz="1980" dirty="0"/>
+              <a:t>BILL_AMT3</a:t>
+            </a:r>
+          </a:p>
+          <a:p>
+            <a:pPr algn="r">
+              <a:lnSpc>
+                <a:spcPct val="81000"/>
+              </a:lnSpc>
+            </a:pPr>
+            <a:r>
+              <a:rPr lang="en-US" sz="1980" dirty="0"/>
+              <a:t>AGE</a:t>
+            </a:r>
+          </a:p>
+          <a:p>
+            <a:pPr algn="r">
+              <a:lnSpc>
+                <a:spcPct val="81000"/>
+              </a:lnSpc>
+            </a:pPr>
+            <a:r>
+              <a:rPr lang="en-US" sz="1980" dirty="0"/>
+              <a:t>SEX</a:t>
+            </a:r>
+          </a:p>
+        </p:txBody>
+      </p:sp>
+      <p:sp>
+        <p:nvSpPr>
+          <p:cNvPr id="5" name="TextBox 4">
+            <a:extLst>
+              <a:ext uri="{FF2B5EF4-FFF2-40B4-BE49-F238E27FC236}">
+                <a16:creationId xmlns:a16="http://schemas.microsoft.com/office/drawing/2014/main" id="{5ED8AD08-53E4-1747-BA6F-A541E6A0263E}"/>
+              </a:ext>
+            </a:extLst>
+          </p:cNvPr>
+          <p:cNvSpPr txBox="1"/>
+          <p:nvPr/>
+        </p:nvSpPr>
+        <p:spPr>
+          <a:xfrm rot="16200000">
+            <a:off x="916597" y="2815374"/>
+            <a:ext cx="3720019" cy="369332"/>
+          </a:xfrm>
+          <a:prstGeom prst="rect">
+            <a:avLst/>
+          </a:prstGeom>
+          <a:solidFill>
+            <a:schemeClr val="bg1"/>
+          </a:solidFill>
+        </p:spPr>
+        <p:txBody>
+          <a:bodyPr wrap="square" rtlCol="0">
+            <a:spAutoFit/>
+          </a:bodyPr>
+          <a:lstStyle/>
+          <a:p>
+            <a:pPr algn="ctr"/>
+            <a:r>
+              <a:rPr lang="en-US" dirty="0"/>
+              <a:t>Shapley Feature Contributions</a:t>
+            </a:r>
+          </a:p>
+        </p:txBody>
+      </p:sp>
+      <p:sp>
+        <p:nvSpPr>
+          <p:cNvPr id="6" name="TextBox 5">
+            <a:extLst>
+              <a:ext uri="{FF2B5EF4-FFF2-40B4-BE49-F238E27FC236}">
+                <a16:creationId xmlns:a16="http://schemas.microsoft.com/office/drawing/2014/main" id="{0708BCAE-785C-A144-800D-71DB035E39BE}"/>
+              </a:ext>
+            </a:extLst>
+          </p:cNvPr>
+          <p:cNvSpPr txBox="1"/>
+          <p:nvPr/>
+        </p:nvSpPr>
+        <p:spPr>
+          <a:xfrm>
+            <a:off x="3385986" y="714323"/>
+            <a:ext cx="5639261" cy="369332"/>
+          </a:xfrm>
+          <a:prstGeom prst="rect">
+            <a:avLst/>
+          </a:prstGeom>
+          <a:solidFill>
+            <a:schemeClr val="bg1"/>
+          </a:solidFill>
+        </p:spPr>
+        <p:txBody>
+          <a:bodyPr wrap="square" rtlCol="0">
+            <a:spAutoFit/>
+          </a:bodyPr>
+          <a:lstStyle/>
+          <a:p>
+            <a:pPr algn="ctr"/>
+            <a:r>
+              <a:rPr lang="en-US" dirty="0"/>
+              <a:t>Local Shapley Feature Contributions to </a:t>
+            </a:r>
+            <a:r>
+              <a:rPr lang="en-US" dirty="0" err="1"/>
+              <a:t>Logloss</a:t>
+            </a:r>
+            <a:endParaRPr lang="en-US" dirty="0"/>
+          </a:p>
+        </p:txBody>
+      </p:sp>
+    </p:spTree>
+    <p:extLst>
+      <p:ext uri="{BB962C8B-B14F-4D97-AF65-F5344CB8AC3E}">
+        <p14:creationId xmlns:p14="http://schemas.microsoft.com/office/powerpoint/2010/main" val="605999594"/>
       </p:ext>
     </p:extLst>
   </p:cSld>

</xml_diff>